<commit_message>
Added Akash Keyboard Shortcuts
</commit_message>
<xml_diff>
--- a/DaVinci Resolve Akash.pptx
+++ b/DaVinci Resolve Akash.pptx
@@ -5,7 +5,7 @@
     <p:sldMasterId id="2147483648" r:id="rId1"/>
   </p:sldMasterIdLst>
   <p:notesMasterIdLst>
-    <p:notesMasterId r:id="rId17"/>
+    <p:notesMasterId r:id="rId23"/>
   </p:notesMasterIdLst>
   <p:sldIdLst>
     <p:sldId id="276" r:id="rId2"/>
@@ -23,6 +23,12 @@
     <p:sldId id="282" r:id="rId14"/>
     <p:sldId id="278" r:id="rId15"/>
     <p:sldId id="279" r:id="rId16"/>
+    <p:sldId id="283" r:id="rId17"/>
+    <p:sldId id="284" r:id="rId18"/>
+    <p:sldId id="285" r:id="rId19"/>
+    <p:sldId id="288" r:id="rId20"/>
+    <p:sldId id="286" r:id="rId21"/>
+    <p:sldId id="287" r:id="rId22"/>
   </p:sldIdLst>
   <p:sldSz cx="12192000" cy="6858000"/>
   <p:notesSz cx="6858000" cy="9144000"/>
@@ -211,7 +217,7 @@
           <a:p>
             <a:fld id="{B8EF7F3D-DD09-BD40-9378-DB20F44946D7}" type="datetimeFigureOut">
               <a:rPr lang="en-US" smtClean="0"/>
-              <a:t>12/4/24</a:t>
+              <a:t>12/10/24</a:t>
             </a:fld>
             <a:endParaRPr lang="en-US"/>
           </a:p>
@@ -712,7 +718,7 @@
           <a:p>
             <a:fld id="{37BF490E-74C7-1845-993F-5424142D85D8}" type="datetimeFigureOut">
               <a:rPr lang="en-US" smtClean="0"/>
-              <a:t>12/4/24</a:t>
+              <a:t>12/10/24</a:t>
             </a:fld>
             <a:endParaRPr lang="en-US"/>
           </a:p>
@@ -912,7 +918,7 @@
           <a:p>
             <a:fld id="{37BF490E-74C7-1845-993F-5424142D85D8}" type="datetimeFigureOut">
               <a:rPr lang="en-US" smtClean="0"/>
-              <a:t>12/4/24</a:t>
+              <a:t>12/10/24</a:t>
             </a:fld>
             <a:endParaRPr lang="en-US"/>
           </a:p>
@@ -1122,7 +1128,7 @@
           <a:p>
             <a:fld id="{37BF490E-74C7-1845-993F-5424142D85D8}" type="datetimeFigureOut">
               <a:rPr lang="en-US" smtClean="0"/>
-              <a:t>12/4/24</a:t>
+              <a:t>12/10/24</a:t>
             </a:fld>
             <a:endParaRPr lang="en-US"/>
           </a:p>
@@ -1322,7 +1328,7 @@
           <a:p>
             <a:fld id="{37BF490E-74C7-1845-993F-5424142D85D8}" type="datetimeFigureOut">
               <a:rPr lang="en-US" smtClean="0"/>
-              <a:t>12/4/24</a:t>
+              <a:t>12/10/24</a:t>
             </a:fld>
             <a:endParaRPr lang="en-US"/>
           </a:p>
@@ -1598,7 +1604,7 @@
           <a:p>
             <a:fld id="{37BF490E-74C7-1845-993F-5424142D85D8}" type="datetimeFigureOut">
               <a:rPr lang="en-US" smtClean="0"/>
-              <a:t>12/4/24</a:t>
+              <a:t>12/10/24</a:t>
             </a:fld>
             <a:endParaRPr lang="en-US"/>
           </a:p>
@@ -1866,7 +1872,7 @@
           <a:p>
             <a:fld id="{37BF490E-74C7-1845-993F-5424142D85D8}" type="datetimeFigureOut">
               <a:rPr lang="en-US" smtClean="0"/>
-              <a:t>12/4/24</a:t>
+              <a:t>12/10/24</a:t>
             </a:fld>
             <a:endParaRPr lang="en-US"/>
           </a:p>
@@ -2281,7 +2287,7 @@
           <a:p>
             <a:fld id="{37BF490E-74C7-1845-993F-5424142D85D8}" type="datetimeFigureOut">
               <a:rPr lang="en-US" smtClean="0"/>
-              <a:t>12/4/24</a:t>
+              <a:t>12/10/24</a:t>
             </a:fld>
             <a:endParaRPr lang="en-US"/>
           </a:p>
@@ -2423,7 +2429,7 @@
           <a:p>
             <a:fld id="{37BF490E-74C7-1845-993F-5424142D85D8}" type="datetimeFigureOut">
               <a:rPr lang="en-US" smtClean="0"/>
-              <a:t>12/4/24</a:t>
+              <a:t>12/10/24</a:t>
             </a:fld>
             <a:endParaRPr lang="en-US"/>
           </a:p>
@@ -2536,7 +2542,7 @@
           <a:p>
             <a:fld id="{37BF490E-74C7-1845-993F-5424142D85D8}" type="datetimeFigureOut">
               <a:rPr lang="en-US" smtClean="0"/>
-              <a:t>12/4/24</a:t>
+              <a:t>12/10/24</a:t>
             </a:fld>
             <a:endParaRPr lang="en-US"/>
           </a:p>
@@ -2849,7 +2855,7 @@
           <a:p>
             <a:fld id="{37BF490E-74C7-1845-993F-5424142D85D8}" type="datetimeFigureOut">
               <a:rPr lang="en-US" smtClean="0"/>
-              <a:t>12/4/24</a:t>
+              <a:t>12/10/24</a:t>
             </a:fld>
             <a:endParaRPr lang="en-US"/>
           </a:p>
@@ -3138,7 +3144,7 @@
           <a:p>
             <a:fld id="{37BF490E-74C7-1845-993F-5424142D85D8}" type="datetimeFigureOut">
               <a:rPr lang="en-US" smtClean="0"/>
-              <a:t>12/4/24</a:t>
+              <a:t>12/10/24</a:t>
             </a:fld>
             <a:endParaRPr lang="en-US"/>
           </a:p>
@@ -3381,7 +3387,7 @@
           <a:p>
             <a:fld id="{37BF490E-74C7-1845-993F-5424142D85D8}" type="datetimeFigureOut">
               <a:rPr lang="en-US" smtClean="0"/>
-              <a:t>12/4/24</a:t>
+              <a:t>12/10/24</a:t>
             </a:fld>
             <a:endParaRPr lang="en-US"/>
           </a:p>
@@ -7202,7 +7208,7 @@
         </p:nvSpPr>
         <p:spPr>
           <a:xfrm>
-            <a:off x="1036320" y="0"/>
+            <a:off x="1140015" y="88960"/>
             <a:ext cx="9727474" cy="646331"/>
           </a:xfrm>
           <a:prstGeom prst="rect">
@@ -7219,331 +7225,11 @@
             <a:pPr algn="ctr"/>
             <a:r>
               <a:rPr lang="en-US" sz="3600" b="1" dirty="0"/>
-              <a:t>Add &amp; Animate Text</a:t>
+              <a:t>Color Tab : Color Wheel</a:t>
             </a:r>
           </a:p>
         </p:txBody>
       </p:sp>
-      <p:graphicFrame>
-        <p:nvGraphicFramePr>
-          <p:cNvPr id="3" name="Table 2">
-            <a:extLst>
-              <a:ext uri="{FF2B5EF4-FFF2-40B4-BE49-F238E27FC236}">
-                <a16:creationId xmlns:a16="http://schemas.microsoft.com/office/drawing/2014/main" id="{2E522E78-9008-3706-97BE-E3E422FB83A3}"/>
-              </a:ext>
-            </a:extLst>
-          </p:cNvPr>
-          <p:cNvGraphicFramePr>
-            <a:graphicFrameLocks noGrp="1"/>
-          </p:cNvGraphicFramePr>
-          <p:nvPr>
-            <p:extLst>
-              <p:ext uri="{D42A27DB-BD31-4B8C-83A1-F6EECF244321}">
-                <p14:modId xmlns:p14="http://schemas.microsoft.com/office/powerpoint/2010/main" val="1567110678"/>
-              </p:ext>
-            </p:extLst>
-          </p:nvPr>
-        </p:nvGraphicFramePr>
-        <p:xfrm>
-          <a:off x="583473" y="646331"/>
-          <a:ext cx="11025054" cy="2194560"/>
-        </p:xfrm>
-        <a:graphic>
-          <a:graphicData uri="http://schemas.openxmlformats.org/drawingml/2006/table">
-            <a:tbl>
-              <a:tblPr firstRow="1" bandRow="1">
-                <a:tableStyleId>{5C22544A-7EE6-4342-B048-85BDC9FD1C3A}</a:tableStyleId>
-              </a:tblPr>
-              <a:tblGrid>
-                <a:gridCol w="5512527">
-                  <a:extLst>
-                    <a:ext uri="{9D8B030D-6E8A-4147-A177-3AD203B41FA5}">
-                      <a16:colId xmlns:a16="http://schemas.microsoft.com/office/drawing/2014/main" val="1154084783"/>
-                    </a:ext>
-                  </a:extLst>
-                </a:gridCol>
-                <a:gridCol w="5512527">
-                  <a:extLst>
-                    <a:ext uri="{9D8B030D-6E8A-4147-A177-3AD203B41FA5}">
-                      <a16:colId xmlns:a16="http://schemas.microsoft.com/office/drawing/2014/main" val="1334558778"/>
-                    </a:ext>
-                  </a:extLst>
-                </a:gridCol>
-              </a:tblGrid>
-              <a:tr h="254063">
-                <a:tc>
-                  <a:txBody>
-                    <a:bodyPr/>
-                    <a:lstStyle/>
-                    <a:p>
-                      <a:r>
-                        <a:rPr lang="en-US" dirty="0"/>
-                        <a:t>Shortcuts</a:t>
-                      </a:r>
-                    </a:p>
-                  </a:txBody>
-                  <a:tcPr/>
-                </a:tc>
-                <a:tc>
-                  <a:txBody>
-                    <a:bodyPr/>
-                    <a:lstStyle/>
-                    <a:p>
-                      <a:r>
-                        <a:rPr lang="en-US" dirty="0"/>
-                        <a:t>Action</a:t>
-                      </a:r>
-                    </a:p>
-                  </a:txBody>
-                  <a:tcPr/>
-                </a:tc>
-                <a:extLst>
-                  <a:ext uri="{0D108BD9-81ED-4DB2-BD59-A6C34878D82A}">
-                    <a16:rowId xmlns:a16="http://schemas.microsoft.com/office/drawing/2014/main" val="1839680496"/>
-                  </a:ext>
-                </a:extLst>
-              </a:tr>
-              <a:tr h="254063">
-                <a:tc>
-                  <a:txBody>
-                    <a:bodyPr/>
-                    <a:lstStyle/>
-                    <a:p>
-                      <a:endParaRPr lang="en-US" dirty="0"/>
-                    </a:p>
-                  </a:txBody>
-                  <a:tcPr/>
-                </a:tc>
-                <a:tc>
-                  <a:txBody>
-                    <a:bodyPr/>
-                    <a:lstStyle/>
-                    <a:p>
-                      <a:endParaRPr lang="en-US" dirty="0"/>
-                    </a:p>
-                  </a:txBody>
-                  <a:tcPr/>
-                </a:tc>
-                <a:extLst>
-                  <a:ext uri="{0D108BD9-81ED-4DB2-BD59-A6C34878D82A}">
-                    <a16:rowId xmlns:a16="http://schemas.microsoft.com/office/drawing/2014/main" val="2615268130"/>
-                  </a:ext>
-                </a:extLst>
-              </a:tr>
-              <a:tr h="145153">
-                <a:tc>
-                  <a:txBody>
-                    <a:bodyPr/>
-                    <a:lstStyle/>
-                    <a:p>
-                      <a:pPr marL="0" marR="0" lvl="0" indent="0" algn="l" defTabSz="914400" rtl="0" eaLnBrk="1" fontAlgn="auto" latinLnBrk="0" hangingPunct="1">
-                        <a:lnSpc>
-                          <a:spcPct val="100000"/>
-                        </a:lnSpc>
-                        <a:spcBef>
-                          <a:spcPts val="0"/>
-                        </a:spcBef>
-                        <a:spcAft>
-                          <a:spcPts val="0"/>
-                        </a:spcAft>
-                        <a:buClrTx/>
-                        <a:buSzTx/>
-                        <a:buFontTx/>
-                        <a:buNone/>
-                        <a:tabLst/>
-                        <a:defRPr/>
-                      </a:pPr>
-                      <a:endParaRPr lang="en-US" dirty="0"/>
-                    </a:p>
-                  </a:txBody>
-                  <a:tcPr/>
-                </a:tc>
-                <a:tc>
-                  <a:txBody>
-                    <a:bodyPr/>
-                    <a:lstStyle/>
-                    <a:p>
-                      <a:pPr marL="0" marR="0" lvl="0" indent="0" algn="l" defTabSz="914400" rtl="0" eaLnBrk="1" fontAlgn="auto" latinLnBrk="0" hangingPunct="1">
-                        <a:lnSpc>
-                          <a:spcPct val="100000"/>
-                        </a:lnSpc>
-                        <a:spcBef>
-                          <a:spcPts val="0"/>
-                        </a:spcBef>
-                        <a:spcAft>
-                          <a:spcPts val="0"/>
-                        </a:spcAft>
-                        <a:buClrTx/>
-                        <a:buSzTx/>
-                        <a:buFontTx/>
-                        <a:buNone/>
-                        <a:tabLst/>
-                        <a:defRPr/>
-                      </a:pPr>
-                      <a:endParaRPr lang="en-US" dirty="0"/>
-                    </a:p>
-                  </a:txBody>
-                  <a:tcPr/>
-                </a:tc>
-                <a:extLst>
-                  <a:ext uri="{0D108BD9-81ED-4DB2-BD59-A6C34878D82A}">
-                    <a16:rowId xmlns:a16="http://schemas.microsoft.com/office/drawing/2014/main" val="1867109100"/>
-                  </a:ext>
-                </a:extLst>
-              </a:tr>
-              <a:tr h="254063">
-                <a:tc>
-                  <a:txBody>
-                    <a:bodyPr/>
-                    <a:lstStyle/>
-                    <a:p>
-                      <a:endParaRPr lang="en-US" dirty="0"/>
-                    </a:p>
-                  </a:txBody>
-                  <a:tcPr/>
-                </a:tc>
-                <a:tc>
-                  <a:txBody>
-                    <a:bodyPr/>
-                    <a:lstStyle/>
-                    <a:p>
-                      <a:endParaRPr lang="en-US" dirty="0"/>
-                    </a:p>
-                  </a:txBody>
-                  <a:tcPr/>
-                </a:tc>
-                <a:extLst>
-                  <a:ext uri="{0D108BD9-81ED-4DB2-BD59-A6C34878D82A}">
-                    <a16:rowId xmlns:a16="http://schemas.microsoft.com/office/drawing/2014/main" val="2318777967"/>
-                  </a:ext>
-                </a:extLst>
-              </a:tr>
-              <a:tr h="254063">
-                <a:tc>
-                  <a:txBody>
-                    <a:bodyPr/>
-                    <a:lstStyle/>
-                    <a:p>
-                      <a:pPr marL="0" marR="0" lvl="0" indent="0" algn="l" defTabSz="914400" rtl="0" eaLnBrk="1" fontAlgn="auto" latinLnBrk="0" hangingPunct="1">
-                        <a:lnSpc>
-                          <a:spcPct val="100000"/>
-                        </a:lnSpc>
-                        <a:spcBef>
-                          <a:spcPts val="0"/>
-                        </a:spcBef>
-                        <a:spcAft>
-                          <a:spcPts val="0"/>
-                        </a:spcAft>
-                        <a:buClrTx/>
-                        <a:buSzTx/>
-                        <a:buFontTx/>
-                        <a:buNone/>
-                        <a:tabLst/>
-                        <a:defRPr/>
-                      </a:pPr>
-                      <a:endParaRPr lang="en-US" dirty="0"/>
-                    </a:p>
-                  </a:txBody>
-                  <a:tcPr/>
-                </a:tc>
-                <a:tc>
-                  <a:txBody>
-                    <a:bodyPr/>
-                    <a:lstStyle/>
-                    <a:p>
-                      <a:pPr marL="0" marR="0" lvl="0" indent="0" algn="l" defTabSz="914400" rtl="0" eaLnBrk="1" fontAlgn="auto" latinLnBrk="0" hangingPunct="1">
-                        <a:lnSpc>
-                          <a:spcPct val="100000"/>
-                        </a:lnSpc>
-                        <a:spcBef>
-                          <a:spcPts val="0"/>
-                        </a:spcBef>
-                        <a:spcAft>
-                          <a:spcPts val="0"/>
-                        </a:spcAft>
-                        <a:buClrTx/>
-                        <a:buSzTx/>
-                        <a:buFontTx/>
-                        <a:buNone/>
-                        <a:tabLst/>
-                        <a:defRPr/>
-                      </a:pPr>
-                      <a:endParaRPr lang="en-US" dirty="0"/>
-                    </a:p>
-                  </a:txBody>
-                  <a:tcPr/>
-                </a:tc>
-                <a:extLst>
-                  <a:ext uri="{0D108BD9-81ED-4DB2-BD59-A6C34878D82A}">
-                    <a16:rowId xmlns:a16="http://schemas.microsoft.com/office/drawing/2014/main" val="1102483375"/>
-                  </a:ext>
-                </a:extLst>
-              </a:tr>
-              <a:tr h="254063">
-                <a:tc>
-                  <a:txBody>
-                    <a:bodyPr/>
-                    <a:lstStyle/>
-                    <a:p>
-                      <a:pPr marL="0" marR="0" lvl="0" indent="0" algn="l" defTabSz="914400" rtl="0" eaLnBrk="1" fontAlgn="auto" latinLnBrk="0" hangingPunct="1">
-                        <a:lnSpc>
-                          <a:spcPct val="100000"/>
-                        </a:lnSpc>
-                        <a:spcBef>
-                          <a:spcPts val="0"/>
-                        </a:spcBef>
-                        <a:spcAft>
-                          <a:spcPts val="0"/>
-                        </a:spcAft>
-                        <a:buClrTx/>
-                        <a:buSzTx/>
-                        <a:buFontTx/>
-                        <a:buNone/>
-                        <a:tabLst/>
-                        <a:defRPr/>
-                      </a:pPr>
-                      <a:endParaRPr lang="en-US" dirty="0"/>
-                    </a:p>
-                  </a:txBody>
-                  <a:tcPr/>
-                </a:tc>
-                <a:tc>
-                  <a:txBody>
-                    <a:bodyPr/>
-                    <a:lstStyle/>
-                    <a:p>
-                      <a:pPr marL="0" marR="0" lvl="0" indent="0" algn="l" defTabSz="914400" rtl="0" eaLnBrk="1" fontAlgn="auto" latinLnBrk="0" hangingPunct="1">
-                        <a:lnSpc>
-                          <a:spcPct val="100000"/>
-                        </a:lnSpc>
-                        <a:spcBef>
-                          <a:spcPts val="0"/>
-                        </a:spcBef>
-                        <a:spcAft>
-                          <a:spcPts val="0"/>
-                        </a:spcAft>
-                        <a:buClrTx/>
-                        <a:buSzTx/>
-                        <a:buFontTx/>
-                        <a:buNone/>
-                        <a:tabLst/>
-                        <a:defRPr/>
-                      </a:pPr>
-                      <a:endParaRPr lang="en-US" dirty="0"/>
-                    </a:p>
-                  </a:txBody>
-                  <a:tcPr/>
-                </a:tc>
-                <a:extLst>
-                  <a:ext uri="{0D108BD9-81ED-4DB2-BD59-A6C34878D82A}">
-                    <a16:rowId xmlns:a16="http://schemas.microsoft.com/office/drawing/2014/main" val="1406528066"/>
-                  </a:ext>
-                </a:extLst>
-              </a:tr>
-            </a:tbl>
-          </a:graphicData>
-        </a:graphic>
-      </p:graphicFrame>
       <p:sp>
         <p:nvSpPr>
           <p:cNvPr id="4" name="TextBox 3">
@@ -7558,7 +7244,7 @@
         </p:nvSpPr>
         <p:spPr>
           <a:xfrm>
-            <a:off x="11652069" y="6426926"/>
+            <a:off x="11755764" y="7162217"/>
             <a:ext cx="184731" cy="369332"/>
           </a:xfrm>
           <a:prstGeom prst="rect">
@@ -7573,6 +7259,490 @@
           <a:lstStyle/>
           <a:p>
             <a:endParaRPr lang="en-US"/>
+          </a:p>
+        </p:txBody>
+      </p:sp>
+      <p:pic>
+        <p:nvPicPr>
+          <p:cNvPr id="5" name="Picture 4">
+            <a:extLst>
+              <a:ext uri="{FF2B5EF4-FFF2-40B4-BE49-F238E27FC236}">
+                <a16:creationId xmlns:a16="http://schemas.microsoft.com/office/drawing/2014/main" id="{2D7409B4-3277-0952-BB68-9C5199C704F5}"/>
+              </a:ext>
+            </a:extLst>
+          </p:cNvPr>
+          <p:cNvPicPr>
+            <a:picLocks noChangeAspect="1"/>
+          </p:cNvPicPr>
+          <p:nvPr/>
+        </p:nvPicPr>
+        <p:blipFill>
+          <a:blip r:embed="rId2"/>
+          <a:stretch>
+            <a:fillRect/>
+          </a:stretch>
+        </p:blipFill>
+        <p:spPr>
+          <a:xfrm>
+            <a:off x="2117552" y="2052417"/>
+            <a:ext cx="7772400" cy="3639286"/>
+          </a:xfrm>
+          <a:prstGeom prst="rect">
+            <a:avLst/>
+          </a:prstGeom>
+        </p:spPr>
+      </p:pic>
+      <p:cxnSp>
+        <p:nvCxnSpPr>
+          <p:cNvPr id="7" name="Straight Arrow Connector 6">
+            <a:extLst>
+              <a:ext uri="{FF2B5EF4-FFF2-40B4-BE49-F238E27FC236}">
+                <a16:creationId xmlns:a16="http://schemas.microsoft.com/office/drawing/2014/main" id="{D588DE70-B381-F2DE-F86F-C3138EDD8465}"/>
+              </a:ext>
+            </a:extLst>
+          </p:cNvPr>
+          <p:cNvCxnSpPr/>
+          <p:nvPr/>
+        </p:nvCxnSpPr>
+        <p:spPr>
+          <a:xfrm flipH="1">
+            <a:off x="1630837" y="3318235"/>
+            <a:ext cx="1319753" cy="0"/>
+          </a:xfrm>
+          <a:prstGeom prst="straightConnector1">
+            <a:avLst/>
+          </a:prstGeom>
+          <a:ln>
+            <a:tailEnd type="triangle"/>
+          </a:ln>
+        </p:spPr>
+        <p:style>
+          <a:lnRef idx="2">
+            <a:schemeClr val="accent5"/>
+          </a:lnRef>
+          <a:fillRef idx="0">
+            <a:schemeClr val="accent5"/>
+          </a:fillRef>
+          <a:effectRef idx="1">
+            <a:schemeClr val="accent5"/>
+          </a:effectRef>
+          <a:fontRef idx="minor">
+            <a:schemeClr val="tx1"/>
+          </a:fontRef>
+        </p:style>
+      </p:cxnSp>
+      <p:sp>
+        <p:nvSpPr>
+          <p:cNvPr id="8" name="TextBox 7">
+            <a:extLst>
+              <a:ext uri="{FF2B5EF4-FFF2-40B4-BE49-F238E27FC236}">
+                <a16:creationId xmlns:a16="http://schemas.microsoft.com/office/drawing/2014/main" id="{AE4E6DD4-3D48-A842-30A0-99C3F9F770D2}"/>
+              </a:ext>
+            </a:extLst>
+          </p:cNvPr>
+          <p:cNvSpPr txBox="1"/>
+          <p:nvPr/>
+        </p:nvSpPr>
+        <p:spPr>
+          <a:xfrm>
+            <a:off x="780921" y="3133569"/>
+            <a:ext cx="985526" cy="369332"/>
+          </a:xfrm>
+          <a:prstGeom prst="rect">
+            <a:avLst/>
+          </a:prstGeom>
+          <a:noFill/>
+        </p:spPr>
+        <p:txBody>
+          <a:bodyPr wrap="none" rtlCol="0">
+            <a:spAutoFit/>
+          </a:bodyPr>
+          <a:lstStyle/>
+          <a:p>
+            <a:r>
+              <a:rPr lang="en-US" dirty="0"/>
+              <a:t>Shadow</a:t>
+            </a:r>
+          </a:p>
+        </p:txBody>
+      </p:sp>
+      <p:cxnSp>
+        <p:nvCxnSpPr>
+          <p:cNvPr id="9" name="Straight Arrow Connector 8">
+            <a:extLst>
+              <a:ext uri="{FF2B5EF4-FFF2-40B4-BE49-F238E27FC236}">
+                <a16:creationId xmlns:a16="http://schemas.microsoft.com/office/drawing/2014/main" id="{201DD183-EDEC-9212-F95C-ADB2DE931ADC}"/>
+              </a:ext>
+            </a:extLst>
+          </p:cNvPr>
+          <p:cNvCxnSpPr>
+            <a:cxnSpLocks/>
+          </p:cNvCxnSpPr>
+          <p:nvPr/>
+        </p:nvCxnSpPr>
+        <p:spPr>
+          <a:xfrm flipH="1" flipV="1">
+            <a:off x="4001724" y="1168217"/>
+            <a:ext cx="985056" cy="2057400"/>
+          </a:xfrm>
+          <a:prstGeom prst="straightConnector1">
+            <a:avLst/>
+          </a:prstGeom>
+          <a:ln>
+            <a:tailEnd type="triangle"/>
+          </a:ln>
+        </p:spPr>
+        <p:style>
+          <a:lnRef idx="2">
+            <a:schemeClr val="accent5"/>
+          </a:lnRef>
+          <a:fillRef idx="0">
+            <a:schemeClr val="accent5"/>
+          </a:fillRef>
+          <a:effectRef idx="1">
+            <a:schemeClr val="accent5"/>
+          </a:effectRef>
+          <a:fontRef idx="minor">
+            <a:schemeClr val="tx1"/>
+          </a:fontRef>
+        </p:style>
+      </p:cxnSp>
+      <p:sp>
+        <p:nvSpPr>
+          <p:cNvPr id="11" name="TextBox 10">
+            <a:extLst>
+              <a:ext uri="{FF2B5EF4-FFF2-40B4-BE49-F238E27FC236}">
+                <a16:creationId xmlns:a16="http://schemas.microsoft.com/office/drawing/2014/main" id="{7CEE8F9C-0E68-8928-74C3-6959F18F1653}"/>
+              </a:ext>
+            </a:extLst>
+          </p:cNvPr>
+          <p:cNvSpPr txBox="1"/>
+          <p:nvPr/>
+        </p:nvSpPr>
+        <p:spPr>
+          <a:xfrm>
+            <a:off x="3010476" y="1019584"/>
+            <a:ext cx="1065484" cy="369332"/>
+          </a:xfrm>
+          <a:prstGeom prst="rect">
+            <a:avLst/>
+          </a:prstGeom>
+          <a:noFill/>
+        </p:spPr>
+        <p:txBody>
+          <a:bodyPr wrap="none" rtlCol="0">
+            <a:spAutoFit/>
+          </a:bodyPr>
+          <a:lstStyle/>
+          <a:p>
+            <a:r>
+              <a:rPr lang="en-US" dirty="0"/>
+              <a:t>Mid Tone</a:t>
+            </a:r>
+          </a:p>
+        </p:txBody>
+      </p:sp>
+      <p:cxnSp>
+        <p:nvCxnSpPr>
+          <p:cNvPr id="13" name="Straight Arrow Connector 12">
+            <a:extLst>
+              <a:ext uri="{FF2B5EF4-FFF2-40B4-BE49-F238E27FC236}">
+                <a16:creationId xmlns:a16="http://schemas.microsoft.com/office/drawing/2014/main" id="{3D764F6D-8DEE-7E8F-DBB2-C8A151700CD2}"/>
+              </a:ext>
+            </a:extLst>
+          </p:cNvPr>
+          <p:cNvCxnSpPr>
+            <a:cxnSpLocks/>
+          </p:cNvCxnSpPr>
+          <p:nvPr/>
+        </p:nvCxnSpPr>
+        <p:spPr>
+          <a:xfrm flipV="1">
+            <a:off x="6870952" y="1243122"/>
+            <a:ext cx="906162" cy="1982495"/>
+          </a:xfrm>
+          <a:prstGeom prst="straightConnector1">
+            <a:avLst/>
+          </a:prstGeom>
+          <a:ln>
+            <a:tailEnd type="triangle"/>
+          </a:ln>
+        </p:spPr>
+        <p:style>
+          <a:lnRef idx="2">
+            <a:schemeClr val="accent5"/>
+          </a:lnRef>
+          <a:fillRef idx="0">
+            <a:schemeClr val="accent5"/>
+          </a:fillRef>
+          <a:effectRef idx="1">
+            <a:schemeClr val="accent5"/>
+          </a:effectRef>
+          <a:fontRef idx="minor">
+            <a:schemeClr val="tx1"/>
+          </a:fontRef>
+        </p:style>
+      </p:cxnSp>
+      <p:sp>
+        <p:nvSpPr>
+          <p:cNvPr id="15" name="TextBox 14">
+            <a:extLst>
+              <a:ext uri="{FF2B5EF4-FFF2-40B4-BE49-F238E27FC236}">
+                <a16:creationId xmlns:a16="http://schemas.microsoft.com/office/drawing/2014/main" id="{FD1E9217-BF9C-7774-DE70-C4F1A19EA9FA}"/>
+              </a:ext>
+            </a:extLst>
+          </p:cNvPr>
+          <p:cNvSpPr txBox="1"/>
+          <p:nvPr/>
+        </p:nvSpPr>
+        <p:spPr>
+          <a:xfrm>
+            <a:off x="7725313" y="1065750"/>
+            <a:ext cx="1227324" cy="369332"/>
+          </a:xfrm>
+          <a:prstGeom prst="rect">
+            <a:avLst/>
+          </a:prstGeom>
+          <a:noFill/>
+        </p:spPr>
+        <p:txBody>
+          <a:bodyPr wrap="none" rtlCol="0">
+            <a:spAutoFit/>
+          </a:bodyPr>
+          <a:lstStyle/>
+          <a:p>
+            <a:r>
+              <a:rPr lang="en-US" dirty="0"/>
+              <a:t>Highlights </a:t>
+            </a:r>
+          </a:p>
+        </p:txBody>
+      </p:sp>
+      <p:cxnSp>
+        <p:nvCxnSpPr>
+          <p:cNvPr id="16" name="Straight Arrow Connector 15">
+            <a:extLst>
+              <a:ext uri="{FF2B5EF4-FFF2-40B4-BE49-F238E27FC236}">
+                <a16:creationId xmlns:a16="http://schemas.microsoft.com/office/drawing/2014/main" id="{413FB862-5F3D-BAB6-780B-1C10D4AB8FA2}"/>
+              </a:ext>
+            </a:extLst>
+          </p:cNvPr>
+          <p:cNvCxnSpPr>
+            <a:cxnSpLocks/>
+          </p:cNvCxnSpPr>
+          <p:nvPr/>
+        </p:nvCxnSpPr>
+        <p:spPr>
+          <a:xfrm flipV="1">
+            <a:off x="8879180" y="1435082"/>
+            <a:ext cx="1460330" cy="1790535"/>
+          </a:xfrm>
+          <a:prstGeom prst="straightConnector1">
+            <a:avLst/>
+          </a:prstGeom>
+          <a:ln>
+            <a:tailEnd type="triangle"/>
+          </a:ln>
+        </p:spPr>
+        <p:style>
+          <a:lnRef idx="2">
+            <a:schemeClr val="accent5"/>
+          </a:lnRef>
+          <a:fillRef idx="0">
+            <a:schemeClr val="accent5"/>
+          </a:fillRef>
+          <a:effectRef idx="1">
+            <a:schemeClr val="accent5"/>
+          </a:effectRef>
+          <a:fontRef idx="minor">
+            <a:schemeClr val="tx1"/>
+          </a:fontRef>
+        </p:style>
+      </p:cxnSp>
+      <p:sp>
+        <p:nvSpPr>
+          <p:cNvPr id="18" name="TextBox 17">
+            <a:extLst>
+              <a:ext uri="{FF2B5EF4-FFF2-40B4-BE49-F238E27FC236}">
+                <a16:creationId xmlns:a16="http://schemas.microsoft.com/office/drawing/2014/main" id="{8B69BF31-4E98-8E21-5879-5E199CD8C586}"/>
+              </a:ext>
+            </a:extLst>
+          </p:cNvPr>
+          <p:cNvSpPr txBox="1"/>
+          <p:nvPr/>
+        </p:nvSpPr>
+        <p:spPr>
+          <a:xfrm>
+            <a:off x="10248245" y="1250416"/>
+            <a:ext cx="888898" cy="369332"/>
+          </a:xfrm>
+          <a:prstGeom prst="rect">
+            <a:avLst/>
+          </a:prstGeom>
+          <a:noFill/>
+        </p:spPr>
+        <p:txBody>
+          <a:bodyPr wrap="none" rtlCol="0">
+            <a:spAutoFit/>
+          </a:bodyPr>
+          <a:lstStyle/>
+          <a:p>
+            <a:r>
+              <a:rPr lang="en-US" dirty="0"/>
+              <a:t>Overall</a:t>
+            </a:r>
+          </a:p>
+        </p:txBody>
+      </p:sp>
+      <p:cxnSp>
+        <p:nvCxnSpPr>
+          <p:cNvPr id="19" name="Straight Arrow Connector 18">
+            <a:extLst>
+              <a:ext uri="{FF2B5EF4-FFF2-40B4-BE49-F238E27FC236}">
+                <a16:creationId xmlns:a16="http://schemas.microsoft.com/office/drawing/2014/main" id="{7C546B05-F09A-0BAB-29CD-388E1078B7E9}"/>
+              </a:ext>
+            </a:extLst>
+          </p:cNvPr>
+          <p:cNvCxnSpPr>
+            <a:cxnSpLocks/>
+          </p:cNvCxnSpPr>
+          <p:nvPr/>
+        </p:nvCxnSpPr>
+        <p:spPr>
+          <a:xfrm flipH="1">
+            <a:off x="1362656" y="5062888"/>
+            <a:ext cx="1146782" cy="184666"/>
+          </a:xfrm>
+          <a:prstGeom prst="straightConnector1">
+            <a:avLst/>
+          </a:prstGeom>
+          <a:ln>
+            <a:tailEnd type="triangle"/>
+          </a:ln>
+        </p:spPr>
+        <p:style>
+          <a:lnRef idx="2">
+            <a:schemeClr val="accent5"/>
+          </a:lnRef>
+          <a:fillRef idx="0">
+            <a:schemeClr val="accent5"/>
+          </a:fillRef>
+          <a:effectRef idx="1">
+            <a:schemeClr val="accent5"/>
+          </a:effectRef>
+          <a:fontRef idx="minor">
+            <a:schemeClr val="tx1"/>
+          </a:fontRef>
+        </p:style>
+      </p:cxnSp>
+      <p:sp>
+        <p:nvSpPr>
+          <p:cNvPr id="24" name="TextBox 23">
+            <a:extLst>
+              <a:ext uri="{FF2B5EF4-FFF2-40B4-BE49-F238E27FC236}">
+                <a16:creationId xmlns:a16="http://schemas.microsoft.com/office/drawing/2014/main" id="{B82B9921-ED2E-F0EF-65D3-279B495F856F}"/>
+              </a:ext>
+            </a:extLst>
+          </p:cNvPr>
+          <p:cNvSpPr txBox="1"/>
+          <p:nvPr/>
+        </p:nvSpPr>
+        <p:spPr>
+          <a:xfrm>
+            <a:off x="206589" y="5062888"/>
+            <a:ext cx="1242648" cy="369332"/>
+          </a:xfrm>
+          <a:prstGeom prst="rect">
+            <a:avLst/>
+          </a:prstGeom>
+          <a:noFill/>
+        </p:spPr>
+        <p:txBody>
+          <a:bodyPr wrap="none" rtlCol="0">
+            <a:spAutoFit/>
+          </a:bodyPr>
+          <a:lstStyle/>
+          <a:p>
+            <a:r>
+              <a:rPr lang="en-US" dirty="0"/>
+              <a:t>Brightness</a:t>
+            </a:r>
+          </a:p>
+        </p:txBody>
+      </p:sp>
+      <p:cxnSp>
+        <p:nvCxnSpPr>
+          <p:cNvPr id="26" name="Straight Arrow Connector 25">
+            <a:extLst>
+              <a:ext uri="{FF2B5EF4-FFF2-40B4-BE49-F238E27FC236}">
+                <a16:creationId xmlns:a16="http://schemas.microsoft.com/office/drawing/2014/main" id="{17094C72-FD4C-A017-10AC-F1C2AF18CAB7}"/>
+              </a:ext>
+            </a:extLst>
+          </p:cNvPr>
+          <p:cNvCxnSpPr>
+            <a:cxnSpLocks/>
+          </p:cNvCxnSpPr>
+          <p:nvPr/>
+        </p:nvCxnSpPr>
+        <p:spPr>
+          <a:xfrm flipH="1">
+            <a:off x="7777114" y="5599370"/>
+            <a:ext cx="1021574" cy="709668"/>
+          </a:xfrm>
+          <a:prstGeom prst="straightConnector1">
+            <a:avLst/>
+          </a:prstGeom>
+          <a:ln>
+            <a:tailEnd type="triangle"/>
+          </a:ln>
+        </p:spPr>
+        <p:style>
+          <a:lnRef idx="2">
+            <a:schemeClr val="accent5"/>
+          </a:lnRef>
+          <a:fillRef idx="0">
+            <a:schemeClr val="accent5"/>
+          </a:fillRef>
+          <a:effectRef idx="1">
+            <a:schemeClr val="accent5"/>
+          </a:effectRef>
+          <a:fontRef idx="minor">
+            <a:schemeClr val="tx1"/>
+          </a:fontRef>
+        </p:style>
+      </p:cxnSp>
+      <p:sp>
+        <p:nvSpPr>
+          <p:cNvPr id="28" name="TextBox 27">
+            <a:extLst>
+              <a:ext uri="{FF2B5EF4-FFF2-40B4-BE49-F238E27FC236}">
+                <a16:creationId xmlns:a16="http://schemas.microsoft.com/office/drawing/2014/main" id="{AECEFE52-250F-B45F-C1AA-AEAFB08DFE9E}"/>
+              </a:ext>
+            </a:extLst>
+          </p:cNvPr>
+          <p:cNvSpPr txBox="1"/>
+          <p:nvPr/>
+        </p:nvSpPr>
+        <p:spPr>
+          <a:xfrm>
+            <a:off x="6996964" y="6184783"/>
+            <a:ext cx="1560299" cy="369332"/>
+          </a:xfrm>
+          <a:prstGeom prst="rect">
+            <a:avLst/>
+          </a:prstGeom>
+          <a:noFill/>
+        </p:spPr>
+        <p:txBody>
+          <a:bodyPr wrap="none" rtlCol="0">
+            <a:spAutoFit/>
+          </a:bodyPr>
+          <a:lstStyle/>
+          <a:p>
+            <a:r>
+              <a:rPr lang="en-US" dirty="0"/>
+              <a:t>Luminous Mix</a:t>
+            </a:r>
           </a:p>
         </p:txBody>
       </p:sp>
@@ -7692,10 +7862,980 @@
           </a:p>
         </p:txBody>
       </p:sp>
+      <p:sp>
+        <p:nvSpPr>
+          <p:cNvPr id="2" name="TextBox 1">
+            <a:extLst>
+              <a:ext uri="{FF2B5EF4-FFF2-40B4-BE49-F238E27FC236}">
+                <a16:creationId xmlns:a16="http://schemas.microsoft.com/office/drawing/2014/main" id="{17E4A8AB-02DD-15F0-3409-0020D3A9B3A8}"/>
+              </a:ext>
+            </a:extLst>
+          </p:cNvPr>
+          <p:cNvSpPr txBox="1"/>
+          <p:nvPr/>
+        </p:nvSpPr>
+        <p:spPr>
+          <a:xfrm>
+            <a:off x="1036320" y="7294"/>
+            <a:ext cx="9727474" cy="646331"/>
+          </a:xfrm>
+          <a:prstGeom prst="rect">
+            <a:avLst/>
+          </a:prstGeom>
+          <a:noFill/>
+        </p:spPr>
+        <p:txBody>
+          <a:bodyPr wrap="square" rtlCol="0">
+            <a:spAutoFit/>
+          </a:bodyPr>
+          <a:lstStyle/>
+          <a:p>
+            <a:pPr algn="ctr"/>
+            <a:r>
+              <a:rPr lang="en-US" sz="3600" b="1" dirty="0"/>
+              <a:t>Color Tab : Custom Curve</a:t>
+            </a:r>
+          </a:p>
+        </p:txBody>
+      </p:sp>
+      <p:pic>
+        <p:nvPicPr>
+          <p:cNvPr id="3" name="Picture 2">
+            <a:extLst>
+              <a:ext uri="{FF2B5EF4-FFF2-40B4-BE49-F238E27FC236}">
+                <a16:creationId xmlns:a16="http://schemas.microsoft.com/office/drawing/2014/main" id="{9DC7A2C1-36E6-B0C6-330E-244A38AD756A}"/>
+              </a:ext>
+            </a:extLst>
+          </p:cNvPr>
+          <p:cNvPicPr>
+            <a:picLocks noChangeAspect="1"/>
+          </p:cNvPicPr>
+          <p:nvPr/>
+        </p:nvPicPr>
+        <p:blipFill>
+          <a:blip r:embed="rId2"/>
+          <a:stretch>
+            <a:fillRect/>
+          </a:stretch>
+        </p:blipFill>
+        <p:spPr>
+          <a:xfrm>
+            <a:off x="829559" y="653625"/>
+            <a:ext cx="8806173" cy="5500470"/>
+          </a:xfrm>
+          <a:prstGeom prst="rect">
+            <a:avLst/>
+          </a:prstGeom>
+        </p:spPr>
+      </p:pic>
+      <p:sp>
+        <p:nvSpPr>
+          <p:cNvPr id="7" name="TextBox 6">
+            <a:extLst>
+              <a:ext uri="{FF2B5EF4-FFF2-40B4-BE49-F238E27FC236}">
+                <a16:creationId xmlns:a16="http://schemas.microsoft.com/office/drawing/2014/main" id="{6E3F7FE9-F62A-F7C5-640D-CCDAC396345B}"/>
+              </a:ext>
+            </a:extLst>
+          </p:cNvPr>
+          <p:cNvSpPr txBox="1"/>
+          <p:nvPr/>
+        </p:nvSpPr>
+        <p:spPr>
+          <a:xfrm>
+            <a:off x="4699903" y="6128861"/>
+            <a:ext cx="1065484" cy="369332"/>
+          </a:xfrm>
+          <a:prstGeom prst="rect">
+            <a:avLst/>
+          </a:prstGeom>
+          <a:noFill/>
+        </p:spPr>
+        <p:txBody>
+          <a:bodyPr wrap="none" rtlCol="0">
+            <a:spAutoFit/>
+          </a:bodyPr>
+          <a:lstStyle/>
+          <a:p>
+            <a:r>
+              <a:rPr lang="en-US" dirty="0"/>
+              <a:t>Mid Tone</a:t>
+            </a:r>
+          </a:p>
+        </p:txBody>
+      </p:sp>
+      <p:sp>
+        <p:nvSpPr>
+          <p:cNvPr id="8" name="TextBox 7">
+            <a:extLst>
+              <a:ext uri="{FF2B5EF4-FFF2-40B4-BE49-F238E27FC236}">
+                <a16:creationId xmlns:a16="http://schemas.microsoft.com/office/drawing/2014/main" id="{65D330B8-0019-3F5B-B7B7-138253613DD7}"/>
+              </a:ext>
+            </a:extLst>
+          </p:cNvPr>
+          <p:cNvSpPr txBox="1"/>
+          <p:nvPr/>
+        </p:nvSpPr>
+        <p:spPr>
+          <a:xfrm>
+            <a:off x="8674197" y="6128861"/>
+            <a:ext cx="1227324" cy="369332"/>
+          </a:xfrm>
+          <a:prstGeom prst="rect">
+            <a:avLst/>
+          </a:prstGeom>
+          <a:noFill/>
+        </p:spPr>
+        <p:txBody>
+          <a:bodyPr wrap="none" rtlCol="0">
+            <a:spAutoFit/>
+          </a:bodyPr>
+          <a:lstStyle/>
+          <a:p>
+            <a:r>
+              <a:rPr lang="en-US" dirty="0"/>
+              <a:t>Highlights </a:t>
+            </a:r>
+          </a:p>
+        </p:txBody>
+      </p:sp>
+      <p:sp>
+        <p:nvSpPr>
+          <p:cNvPr id="9" name="TextBox 8">
+            <a:extLst>
+              <a:ext uri="{FF2B5EF4-FFF2-40B4-BE49-F238E27FC236}">
+                <a16:creationId xmlns:a16="http://schemas.microsoft.com/office/drawing/2014/main" id="{AD602C84-B97E-348D-60EE-BA7ECF2B5C61}"/>
+              </a:ext>
+            </a:extLst>
+          </p:cNvPr>
+          <p:cNvSpPr txBox="1"/>
+          <p:nvPr/>
+        </p:nvSpPr>
+        <p:spPr>
+          <a:xfrm>
+            <a:off x="722075" y="6128861"/>
+            <a:ext cx="1069018" cy="369332"/>
+          </a:xfrm>
+          <a:prstGeom prst="rect">
+            <a:avLst/>
+          </a:prstGeom>
+          <a:noFill/>
+        </p:spPr>
+        <p:txBody>
+          <a:bodyPr wrap="square" rtlCol="0">
+            <a:spAutoFit/>
+          </a:bodyPr>
+          <a:lstStyle/>
+          <a:p>
+            <a:r>
+              <a:rPr lang="en-US" dirty="0"/>
+              <a:t>Shadow </a:t>
+            </a:r>
+          </a:p>
+        </p:txBody>
+      </p:sp>
+      <p:sp>
+        <p:nvSpPr>
+          <p:cNvPr id="10" name="TextBox 9">
+            <a:extLst>
+              <a:ext uri="{FF2B5EF4-FFF2-40B4-BE49-F238E27FC236}">
+                <a16:creationId xmlns:a16="http://schemas.microsoft.com/office/drawing/2014/main" id="{7E1B18A2-E9C9-4771-E591-C963EEB133E1}"/>
+              </a:ext>
+            </a:extLst>
+          </p:cNvPr>
+          <p:cNvSpPr txBox="1"/>
+          <p:nvPr/>
+        </p:nvSpPr>
+        <p:spPr>
+          <a:xfrm>
+            <a:off x="319278" y="334573"/>
+            <a:ext cx="1227324" cy="369332"/>
+          </a:xfrm>
+          <a:prstGeom prst="rect">
+            <a:avLst/>
+          </a:prstGeom>
+          <a:noFill/>
+        </p:spPr>
+        <p:txBody>
+          <a:bodyPr wrap="none" rtlCol="0">
+            <a:spAutoFit/>
+          </a:bodyPr>
+          <a:lstStyle/>
+          <a:p>
+            <a:r>
+              <a:rPr lang="en-US" dirty="0"/>
+              <a:t>Highlights </a:t>
+            </a:r>
+          </a:p>
+        </p:txBody>
+      </p:sp>
+      <p:sp>
+        <p:nvSpPr>
+          <p:cNvPr id="11" name="TextBox 10">
+            <a:extLst>
+              <a:ext uri="{FF2B5EF4-FFF2-40B4-BE49-F238E27FC236}">
+                <a16:creationId xmlns:a16="http://schemas.microsoft.com/office/drawing/2014/main" id="{31934341-5B21-AEB2-903E-230DD3E8EE4F}"/>
+              </a:ext>
+            </a:extLst>
+          </p:cNvPr>
+          <p:cNvSpPr txBox="1"/>
+          <p:nvPr/>
+        </p:nvSpPr>
+        <p:spPr>
+          <a:xfrm>
+            <a:off x="-29164" y="2680222"/>
+            <a:ext cx="1065484" cy="369332"/>
+          </a:xfrm>
+          <a:prstGeom prst="rect">
+            <a:avLst/>
+          </a:prstGeom>
+          <a:noFill/>
+        </p:spPr>
+        <p:txBody>
+          <a:bodyPr wrap="none" rtlCol="0">
+            <a:spAutoFit/>
+          </a:bodyPr>
+          <a:lstStyle/>
+          <a:p>
+            <a:r>
+              <a:rPr lang="en-US" dirty="0"/>
+              <a:t>Mid Tone</a:t>
+            </a:r>
+          </a:p>
+        </p:txBody>
+      </p:sp>
     </p:spTree>
     <p:extLst>
       <p:ext uri="{BB962C8B-B14F-4D97-AF65-F5344CB8AC3E}">
         <p14:creationId xmlns:p14="http://schemas.microsoft.com/office/powerpoint/2010/main" val="3629928019"/>
+      </p:ext>
+    </p:extLst>
+  </p:cSld>
+  <p:clrMapOvr>
+    <a:masterClrMapping/>
+  </p:clrMapOvr>
+</p:sld>
+</file>
+
+<file path=ppt/slides/slide16.xml><?xml version="1.0" encoding="utf-8"?>
+<p:sld xmlns:a="http://schemas.openxmlformats.org/drawingml/2006/main" xmlns:r="http://schemas.openxmlformats.org/officeDocument/2006/relationships" xmlns:p="http://schemas.openxmlformats.org/presentationml/2006/main">
+  <p:cSld>
+    <p:bg>
+      <p:bgPr>
+        <a:solidFill>
+          <a:schemeClr val="bg1"/>
+        </a:solidFill>
+        <a:effectLst/>
+      </p:bgPr>
+    </p:bg>
+    <p:spTree>
+      <p:nvGrpSpPr>
+        <p:cNvPr id="1" name="">
+          <a:extLst>
+            <a:ext uri="{FF2B5EF4-FFF2-40B4-BE49-F238E27FC236}">
+              <a16:creationId xmlns:a16="http://schemas.microsoft.com/office/drawing/2014/main" id="{D3846EA5-972A-E243-C27B-87DE6D9D48F1}"/>
+            </a:ext>
+          </a:extLst>
+        </p:cNvPr>
+        <p:cNvGrpSpPr/>
+        <p:nvPr/>
+      </p:nvGrpSpPr>
+      <p:grpSpPr>
+        <a:xfrm>
+          <a:off x="0" y="0"/>
+          <a:ext cx="0" cy="0"/>
+          <a:chOff x="0" y="0"/>
+          <a:chExt cx="0" cy="0"/>
+        </a:xfrm>
+      </p:grpSpPr>
+      <p:sp>
+        <p:nvSpPr>
+          <p:cNvPr id="21" name="Rectangle 20">
+            <a:extLst>
+              <a:ext uri="{FF2B5EF4-FFF2-40B4-BE49-F238E27FC236}">
+                <a16:creationId xmlns:a16="http://schemas.microsoft.com/office/drawing/2014/main" id="{F9B901D4-408B-A64E-F026-359679DA3E16}"/>
+              </a:ext>
+              <a:ext uri="{C183D7F6-B498-43B3-948B-1728B52AA6E4}">
+                <adec:decorative xmlns:adec="http://schemas.microsoft.com/office/drawing/2017/decorative" val="1"/>
+              </a:ext>
+            </a:extLst>
+          </p:cNvPr>
+          <p:cNvSpPr>
+            <a:spLocks noGrp="1" noRot="1" noChangeAspect="1" noMove="1" noResize="1" noEditPoints="1" noAdjustHandles="1" noChangeArrowheads="1" noChangeShapeType="1" noTextEdit="1"/>
+          </p:cNvSpPr>
+          <p:nvPr>
+            <p:extLst>
+              <p:ext uri="{386F3935-93C4-4BCD-93E2-E3B085C9AB24}">
+                <p16:designElem xmlns:p16="http://schemas.microsoft.com/office/powerpoint/2015/main" val="1"/>
+              </p:ext>
+            </p:extLst>
+          </p:nvPr>
+        </p:nvSpPr>
+        <p:spPr>
+          <a:xfrm>
+            <a:off x="0" y="0"/>
+            <a:ext cx="12192000" cy="6858000"/>
+          </a:xfrm>
+          <a:prstGeom prst="rect">
+            <a:avLst/>
+          </a:prstGeom>
+          <a:gradFill flip="none" rotWithShape="1">
+            <a:gsLst>
+              <a:gs pos="0">
+                <a:schemeClr val="accent1"/>
+              </a:gs>
+              <a:gs pos="100000">
+                <a:schemeClr val="accent2"/>
+              </a:gs>
+            </a:gsLst>
+            <a:lin ang="2700000" scaled="1"/>
+            <a:tileRect/>
+          </a:gradFill>
+          <a:ln>
+            <a:noFill/>
+          </a:ln>
+        </p:spPr>
+        <p:style>
+          <a:lnRef idx="2">
+            <a:schemeClr val="accent1">
+              <a:shade val="50000"/>
+            </a:schemeClr>
+          </a:lnRef>
+          <a:fillRef idx="1">
+            <a:schemeClr val="accent1"/>
+          </a:fillRef>
+          <a:effectRef idx="0">
+            <a:schemeClr val="accent1"/>
+          </a:effectRef>
+          <a:fontRef idx="minor">
+            <a:schemeClr val="lt1"/>
+          </a:fontRef>
+        </p:style>
+        <p:txBody>
+          <a:bodyPr rtlCol="0" anchor="ctr"/>
+          <a:lstStyle/>
+          <a:p>
+            <a:pPr algn="ctr"/>
+            <a:endParaRPr lang="en-US"/>
+          </a:p>
+        </p:txBody>
+      </p:sp>
+      <p:sp>
+        <p:nvSpPr>
+          <p:cNvPr id="2" name="TextBox 1">
+            <a:extLst>
+              <a:ext uri="{FF2B5EF4-FFF2-40B4-BE49-F238E27FC236}">
+                <a16:creationId xmlns:a16="http://schemas.microsoft.com/office/drawing/2014/main" id="{E85FD91A-029E-80F5-7485-0CF4B0A91F43}"/>
+              </a:ext>
+            </a:extLst>
+          </p:cNvPr>
+          <p:cNvSpPr txBox="1"/>
+          <p:nvPr/>
+        </p:nvSpPr>
+        <p:spPr>
+          <a:xfrm>
+            <a:off x="807720" y="134294"/>
+            <a:ext cx="9727474" cy="646331"/>
+          </a:xfrm>
+          <a:prstGeom prst="rect">
+            <a:avLst/>
+          </a:prstGeom>
+          <a:noFill/>
+        </p:spPr>
+        <p:txBody>
+          <a:bodyPr wrap="square" rtlCol="0">
+            <a:spAutoFit/>
+          </a:bodyPr>
+          <a:lstStyle/>
+          <a:p>
+            <a:pPr algn="ctr"/>
+            <a:r>
+              <a:rPr lang="en-US" sz="3600" b="1" dirty="0"/>
+              <a:t>Color Tab :Power Window or Masking</a:t>
+            </a:r>
+          </a:p>
+        </p:txBody>
+      </p:sp>
+      <p:pic>
+        <p:nvPicPr>
+          <p:cNvPr id="3" name="Picture 2">
+            <a:extLst>
+              <a:ext uri="{FF2B5EF4-FFF2-40B4-BE49-F238E27FC236}">
+                <a16:creationId xmlns:a16="http://schemas.microsoft.com/office/drawing/2014/main" id="{6B416B39-9C6F-C0AC-5B7B-EDAA3B62E9A3}"/>
+              </a:ext>
+            </a:extLst>
+          </p:cNvPr>
+          <p:cNvPicPr>
+            <a:picLocks noChangeAspect="1"/>
+          </p:cNvPicPr>
+          <p:nvPr/>
+        </p:nvPicPr>
+        <p:blipFill>
+          <a:blip r:embed="rId2"/>
+          <a:stretch>
+            <a:fillRect/>
+          </a:stretch>
+        </p:blipFill>
+        <p:spPr>
+          <a:xfrm>
+            <a:off x="2742907" y="1195403"/>
+            <a:ext cx="7323808" cy="1679772"/>
+          </a:xfrm>
+          <a:prstGeom prst="rect">
+            <a:avLst/>
+          </a:prstGeom>
+        </p:spPr>
+      </p:pic>
+      <p:pic>
+        <p:nvPicPr>
+          <p:cNvPr id="4" name="Picture 3">
+            <a:extLst>
+              <a:ext uri="{FF2B5EF4-FFF2-40B4-BE49-F238E27FC236}">
+                <a16:creationId xmlns:a16="http://schemas.microsoft.com/office/drawing/2014/main" id="{63EA5E4A-E290-8759-543A-53D31F48127B}"/>
+              </a:ext>
+            </a:extLst>
+          </p:cNvPr>
+          <p:cNvPicPr>
+            <a:picLocks noChangeAspect="1"/>
+          </p:cNvPicPr>
+          <p:nvPr/>
+        </p:nvPicPr>
+        <p:blipFill>
+          <a:blip r:embed="rId3"/>
+          <a:stretch>
+            <a:fillRect/>
+          </a:stretch>
+        </p:blipFill>
+        <p:spPr>
+          <a:xfrm>
+            <a:off x="2742906" y="3206408"/>
+            <a:ext cx="7269761" cy="1997187"/>
+          </a:xfrm>
+          <a:prstGeom prst="rect">
+            <a:avLst/>
+          </a:prstGeom>
+        </p:spPr>
+      </p:pic>
+    </p:spTree>
+    <p:extLst>
+      <p:ext uri="{BB962C8B-B14F-4D97-AF65-F5344CB8AC3E}">
+        <p14:creationId xmlns:p14="http://schemas.microsoft.com/office/powerpoint/2010/main" val="609264626"/>
+      </p:ext>
+    </p:extLst>
+  </p:cSld>
+  <p:clrMapOvr>
+    <a:masterClrMapping/>
+  </p:clrMapOvr>
+</p:sld>
+</file>
+
+<file path=ppt/slides/slide17.xml><?xml version="1.0" encoding="utf-8"?>
+<p:sld xmlns:a="http://schemas.openxmlformats.org/drawingml/2006/main" xmlns:r="http://schemas.openxmlformats.org/officeDocument/2006/relationships" xmlns:p="http://schemas.openxmlformats.org/presentationml/2006/main">
+  <p:cSld>
+    <p:bg>
+      <p:bgPr>
+        <a:solidFill>
+          <a:schemeClr val="bg1"/>
+        </a:solidFill>
+        <a:effectLst/>
+      </p:bgPr>
+    </p:bg>
+    <p:spTree>
+      <p:nvGrpSpPr>
+        <p:cNvPr id="1" name="">
+          <a:extLst>
+            <a:ext uri="{FF2B5EF4-FFF2-40B4-BE49-F238E27FC236}">
+              <a16:creationId xmlns:a16="http://schemas.microsoft.com/office/drawing/2014/main" id="{C4D0F391-AA9D-4F13-5EF3-46841C8A0DAE}"/>
+            </a:ext>
+          </a:extLst>
+        </p:cNvPr>
+        <p:cNvGrpSpPr/>
+        <p:nvPr/>
+      </p:nvGrpSpPr>
+      <p:grpSpPr>
+        <a:xfrm>
+          <a:off x="0" y="0"/>
+          <a:ext cx="0" cy="0"/>
+          <a:chOff x="0" y="0"/>
+          <a:chExt cx="0" cy="0"/>
+        </a:xfrm>
+      </p:grpSpPr>
+      <p:sp>
+        <p:nvSpPr>
+          <p:cNvPr id="21" name="Rectangle 20">
+            <a:extLst>
+              <a:ext uri="{FF2B5EF4-FFF2-40B4-BE49-F238E27FC236}">
+                <a16:creationId xmlns:a16="http://schemas.microsoft.com/office/drawing/2014/main" id="{0BD64A18-ED00-856F-5300-2CC5F40E418B}"/>
+              </a:ext>
+              <a:ext uri="{C183D7F6-B498-43B3-948B-1728B52AA6E4}">
+                <adec:decorative xmlns:adec="http://schemas.microsoft.com/office/drawing/2017/decorative" val="1"/>
+              </a:ext>
+            </a:extLst>
+          </p:cNvPr>
+          <p:cNvSpPr>
+            <a:spLocks noGrp="1" noRot="1" noChangeAspect="1" noMove="1" noResize="1" noEditPoints="1" noAdjustHandles="1" noChangeArrowheads="1" noChangeShapeType="1" noTextEdit="1"/>
+          </p:cNvSpPr>
+          <p:nvPr>
+            <p:extLst>
+              <p:ext uri="{386F3935-93C4-4BCD-93E2-E3B085C9AB24}">
+                <p16:designElem xmlns:p16="http://schemas.microsoft.com/office/powerpoint/2015/main" val="1"/>
+              </p:ext>
+            </p:extLst>
+          </p:nvPr>
+        </p:nvSpPr>
+        <p:spPr>
+          <a:xfrm>
+            <a:off x="0" y="0"/>
+            <a:ext cx="12192000" cy="6858000"/>
+          </a:xfrm>
+          <a:prstGeom prst="rect">
+            <a:avLst/>
+          </a:prstGeom>
+          <a:gradFill flip="none" rotWithShape="1">
+            <a:gsLst>
+              <a:gs pos="0">
+                <a:schemeClr val="accent1"/>
+              </a:gs>
+              <a:gs pos="100000">
+                <a:schemeClr val="accent2"/>
+              </a:gs>
+            </a:gsLst>
+            <a:lin ang="2700000" scaled="1"/>
+            <a:tileRect/>
+          </a:gradFill>
+          <a:ln>
+            <a:noFill/>
+          </a:ln>
+        </p:spPr>
+        <p:style>
+          <a:lnRef idx="2">
+            <a:schemeClr val="accent1">
+              <a:shade val="50000"/>
+            </a:schemeClr>
+          </a:lnRef>
+          <a:fillRef idx="1">
+            <a:schemeClr val="accent1"/>
+          </a:fillRef>
+          <a:effectRef idx="0">
+            <a:schemeClr val="accent1"/>
+          </a:effectRef>
+          <a:fontRef idx="minor">
+            <a:schemeClr val="lt1"/>
+          </a:fontRef>
+        </p:style>
+        <p:txBody>
+          <a:bodyPr rtlCol="0" anchor="ctr"/>
+          <a:lstStyle/>
+          <a:p>
+            <a:pPr algn="ctr"/>
+            <a:endParaRPr lang="en-US"/>
+          </a:p>
+        </p:txBody>
+      </p:sp>
+      <p:sp>
+        <p:nvSpPr>
+          <p:cNvPr id="2" name="TextBox 1">
+            <a:extLst>
+              <a:ext uri="{FF2B5EF4-FFF2-40B4-BE49-F238E27FC236}">
+                <a16:creationId xmlns:a16="http://schemas.microsoft.com/office/drawing/2014/main" id="{23DB60CE-BEAA-AE9E-B65C-B525D90BB491}"/>
+              </a:ext>
+            </a:extLst>
+          </p:cNvPr>
+          <p:cNvSpPr txBox="1"/>
+          <p:nvPr/>
+        </p:nvSpPr>
+        <p:spPr>
+          <a:xfrm>
+            <a:off x="1036320" y="7294"/>
+            <a:ext cx="9727474" cy="646331"/>
+          </a:xfrm>
+          <a:prstGeom prst="rect">
+            <a:avLst/>
+          </a:prstGeom>
+          <a:noFill/>
+        </p:spPr>
+        <p:txBody>
+          <a:bodyPr wrap="square" rtlCol="0">
+            <a:spAutoFit/>
+          </a:bodyPr>
+          <a:lstStyle/>
+          <a:p>
+            <a:pPr algn="ctr"/>
+            <a:r>
+              <a:rPr lang="en-US" sz="3600" b="1"/>
+              <a:t>Color Tab : Key Framing </a:t>
+            </a:r>
+            <a:endParaRPr lang="en-US" sz="3600" b="1" dirty="0"/>
+          </a:p>
+        </p:txBody>
+      </p:sp>
+      <p:pic>
+        <p:nvPicPr>
+          <p:cNvPr id="5" name="Picture 4">
+            <a:extLst>
+              <a:ext uri="{FF2B5EF4-FFF2-40B4-BE49-F238E27FC236}">
+                <a16:creationId xmlns:a16="http://schemas.microsoft.com/office/drawing/2014/main" id="{E21451F7-E285-0099-C95B-7B411A48D526}"/>
+              </a:ext>
+            </a:extLst>
+          </p:cNvPr>
+          <p:cNvPicPr>
+            <a:picLocks noChangeAspect="1"/>
+          </p:cNvPicPr>
+          <p:nvPr/>
+        </p:nvPicPr>
+        <p:blipFill>
+          <a:blip r:embed="rId2"/>
+          <a:stretch>
+            <a:fillRect/>
+          </a:stretch>
+        </p:blipFill>
+        <p:spPr>
+          <a:xfrm>
+            <a:off x="1036320" y="970172"/>
+            <a:ext cx="10719568" cy="905761"/>
+          </a:xfrm>
+          <a:prstGeom prst="rect">
+            <a:avLst/>
+          </a:prstGeom>
+        </p:spPr>
+      </p:pic>
+      <p:pic>
+        <p:nvPicPr>
+          <p:cNvPr id="6" name="Picture 5">
+            <a:extLst>
+              <a:ext uri="{FF2B5EF4-FFF2-40B4-BE49-F238E27FC236}">
+                <a16:creationId xmlns:a16="http://schemas.microsoft.com/office/drawing/2014/main" id="{6EF66FF6-4658-4DBD-F8BB-842EB78D2CA6}"/>
+              </a:ext>
+            </a:extLst>
+          </p:cNvPr>
+          <p:cNvPicPr>
+            <a:picLocks noChangeAspect="1"/>
+          </p:cNvPicPr>
+          <p:nvPr/>
+        </p:nvPicPr>
+        <p:blipFill>
+          <a:blip r:embed="rId3"/>
+          <a:stretch>
+            <a:fillRect/>
+          </a:stretch>
+        </p:blipFill>
+        <p:spPr>
+          <a:xfrm>
+            <a:off x="1036319" y="2480345"/>
+            <a:ext cx="10805629" cy="1016999"/>
+          </a:xfrm>
+          <a:prstGeom prst="rect">
+            <a:avLst/>
+          </a:prstGeom>
+        </p:spPr>
+      </p:pic>
+    </p:spTree>
+    <p:extLst>
+      <p:ext uri="{BB962C8B-B14F-4D97-AF65-F5344CB8AC3E}">
+        <p14:creationId xmlns:p14="http://schemas.microsoft.com/office/powerpoint/2010/main" val="2298337412"/>
+      </p:ext>
+    </p:extLst>
+  </p:cSld>
+  <p:clrMapOvr>
+    <a:masterClrMapping/>
+  </p:clrMapOvr>
+</p:sld>
+</file>
+
+<file path=ppt/slides/slide18.xml><?xml version="1.0" encoding="utf-8"?>
+<p:sld xmlns:a="http://schemas.openxmlformats.org/drawingml/2006/main" xmlns:r="http://schemas.openxmlformats.org/officeDocument/2006/relationships" xmlns:p="http://schemas.openxmlformats.org/presentationml/2006/main">
+  <p:cSld>
+    <p:bg>
+      <p:bgPr>
+        <a:solidFill>
+          <a:schemeClr val="bg1"/>
+        </a:solidFill>
+        <a:effectLst/>
+      </p:bgPr>
+    </p:bg>
+    <p:spTree>
+      <p:nvGrpSpPr>
+        <p:cNvPr id="1" name="">
+          <a:extLst>
+            <a:ext uri="{FF2B5EF4-FFF2-40B4-BE49-F238E27FC236}">
+              <a16:creationId xmlns:a16="http://schemas.microsoft.com/office/drawing/2014/main" id="{6443488A-6743-B55C-357C-0AC22A3A905A}"/>
+            </a:ext>
+          </a:extLst>
+        </p:cNvPr>
+        <p:cNvGrpSpPr/>
+        <p:nvPr/>
+      </p:nvGrpSpPr>
+      <p:grpSpPr>
+        <a:xfrm>
+          <a:off x="0" y="0"/>
+          <a:ext cx="0" cy="0"/>
+          <a:chOff x="0" y="0"/>
+          <a:chExt cx="0" cy="0"/>
+        </a:xfrm>
+      </p:grpSpPr>
+      <p:sp>
+        <p:nvSpPr>
+          <p:cNvPr id="21" name="Rectangle 20">
+            <a:extLst>
+              <a:ext uri="{FF2B5EF4-FFF2-40B4-BE49-F238E27FC236}">
+                <a16:creationId xmlns:a16="http://schemas.microsoft.com/office/drawing/2014/main" id="{B048AA3C-F80E-3491-34BB-EB76406D834B}"/>
+              </a:ext>
+              <a:ext uri="{C183D7F6-B498-43B3-948B-1728B52AA6E4}">
+                <adec:decorative xmlns:adec="http://schemas.microsoft.com/office/drawing/2017/decorative" val="1"/>
+              </a:ext>
+            </a:extLst>
+          </p:cNvPr>
+          <p:cNvSpPr>
+            <a:spLocks noGrp="1" noRot="1" noChangeAspect="1" noMove="1" noResize="1" noEditPoints="1" noAdjustHandles="1" noChangeArrowheads="1" noChangeShapeType="1" noTextEdit="1"/>
+          </p:cNvSpPr>
+          <p:nvPr>
+            <p:extLst>
+              <p:ext uri="{386F3935-93C4-4BCD-93E2-E3B085C9AB24}">
+                <p16:designElem xmlns:p16="http://schemas.microsoft.com/office/powerpoint/2015/main" val="1"/>
+              </p:ext>
+            </p:extLst>
+          </p:nvPr>
+        </p:nvSpPr>
+        <p:spPr>
+          <a:xfrm>
+            <a:off x="0" y="0"/>
+            <a:ext cx="12192000" cy="6858000"/>
+          </a:xfrm>
+          <a:prstGeom prst="rect">
+            <a:avLst/>
+          </a:prstGeom>
+          <a:gradFill flip="none" rotWithShape="1">
+            <a:gsLst>
+              <a:gs pos="0">
+                <a:schemeClr val="accent1"/>
+              </a:gs>
+              <a:gs pos="100000">
+                <a:schemeClr val="accent2"/>
+              </a:gs>
+            </a:gsLst>
+            <a:lin ang="2700000" scaled="1"/>
+            <a:tileRect/>
+          </a:gradFill>
+          <a:ln>
+            <a:noFill/>
+          </a:ln>
+        </p:spPr>
+        <p:style>
+          <a:lnRef idx="2">
+            <a:schemeClr val="accent1">
+              <a:shade val="50000"/>
+            </a:schemeClr>
+          </a:lnRef>
+          <a:fillRef idx="1">
+            <a:schemeClr val="accent1"/>
+          </a:fillRef>
+          <a:effectRef idx="0">
+            <a:schemeClr val="accent1"/>
+          </a:effectRef>
+          <a:fontRef idx="minor">
+            <a:schemeClr val="lt1"/>
+          </a:fontRef>
+        </p:style>
+        <p:txBody>
+          <a:bodyPr rtlCol="0" anchor="ctr"/>
+          <a:lstStyle/>
+          <a:p>
+            <a:pPr algn="ctr"/>
+            <a:endParaRPr lang="en-US"/>
+          </a:p>
+        </p:txBody>
+      </p:sp>
+      <p:sp>
+        <p:nvSpPr>
+          <p:cNvPr id="2" name="TextBox 1">
+            <a:extLst>
+              <a:ext uri="{FF2B5EF4-FFF2-40B4-BE49-F238E27FC236}">
+                <a16:creationId xmlns:a16="http://schemas.microsoft.com/office/drawing/2014/main" id="{7734A761-6B5C-95F6-3D3C-EA78C142C3F4}"/>
+              </a:ext>
+            </a:extLst>
+          </p:cNvPr>
+          <p:cNvSpPr txBox="1"/>
+          <p:nvPr/>
+        </p:nvSpPr>
+        <p:spPr>
+          <a:xfrm>
+            <a:off x="1036320" y="7294"/>
+            <a:ext cx="9727474" cy="646331"/>
+          </a:xfrm>
+          <a:prstGeom prst="rect">
+            <a:avLst/>
+          </a:prstGeom>
+          <a:noFill/>
+        </p:spPr>
+        <p:txBody>
+          <a:bodyPr wrap="square" rtlCol="0">
+            <a:spAutoFit/>
+          </a:bodyPr>
+          <a:lstStyle/>
+          <a:p>
+            <a:pPr algn="ctr"/>
+            <a:r>
+              <a:rPr lang="en-US" sz="3600" b="1" dirty="0"/>
+              <a:t>Color Tab : Versions </a:t>
+            </a:r>
+          </a:p>
+        </p:txBody>
+      </p:sp>
+    </p:spTree>
+    <p:extLst>
+      <p:ext uri="{BB962C8B-B14F-4D97-AF65-F5344CB8AC3E}">
+        <p14:creationId xmlns:p14="http://schemas.microsoft.com/office/powerpoint/2010/main" val="4051302429"/>
+      </p:ext>
+    </p:extLst>
+  </p:cSld>
+  <p:clrMapOvr>
+    <a:masterClrMapping/>
+  </p:clrMapOvr>
+</p:sld>
+</file>
+
+<file path=ppt/slides/slide19.xml><?xml version="1.0" encoding="utf-8"?>
+<p:sld xmlns:a="http://schemas.openxmlformats.org/drawingml/2006/main" xmlns:r="http://schemas.openxmlformats.org/officeDocument/2006/relationships" xmlns:p="http://schemas.openxmlformats.org/presentationml/2006/main">
+  <p:cSld>
+    <p:bg>
+      <p:bgPr>
+        <a:solidFill>
+          <a:schemeClr val="bg1"/>
+        </a:solidFill>
+        <a:effectLst/>
+      </p:bgPr>
+    </p:bg>
+    <p:spTree>
+      <p:nvGrpSpPr>
+        <p:cNvPr id="1" name="">
+          <a:extLst>
+            <a:ext uri="{FF2B5EF4-FFF2-40B4-BE49-F238E27FC236}">
+              <a16:creationId xmlns:a16="http://schemas.microsoft.com/office/drawing/2014/main" id="{62A68631-09EF-241B-E3EF-8106D94FBD57}"/>
+            </a:ext>
+          </a:extLst>
+        </p:cNvPr>
+        <p:cNvGrpSpPr/>
+        <p:nvPr/>
+      </p:nvGrpSpPr>
+      <p:grpSpPr>
+        <a:xfrm>
+          <a:off x="0" y="0"/>
+          <a:ext cx="0" cy="0"/>
+          <a:chOff x="0" y="0"/>
+          <a:chExt cx="0" cy="0"/>
+        </a:xfrm>
+      </p:grpSpPr>
+      <p:sp>
+        <p:nvSpPr>
+          <p:cNvPr id="21" name="Rectangle 20">
+            <a:extLst>
+              <a:ext uri="{FF2B5EF4-FFF2-40B4-BE49-F238E27FC236}">
+                <a16:creationId xmlns:a16="http://schemas.microsoft.com/office/drawing/2014/main" id="{B102337D-F94B-C96D-ED39-195A663CDE27}"/>
+              </a:ext>
+              <a:ext uri="{C183D7F6-B498-43B3-948B-1728B52AA6E4}">
+                <adec:decorative xmlns:adec="http://schemas.microsoft.com/office/drawing/2017/decorative" val="1"/>
+              </a:ext>
+            </a:extLst>
+          </p:cNvPr>
+          <p:cNvSpPr>
+            <a:spLocks noGrp="1" noRot="1" noChangeAspect="1" noMove="1" noResize="1" noEditPoints="1" noAdjustHandles="1" noChangeArrowheads="1" noChangeShapeType="1" noTextEdit="1"/>
+          </p:cNvSpPr>
+          <p:nvPr>
+            <p:extLst>
+              <p:ext uri="{386F3935-93C4-4BCD-93E2-E3B085C9AB24}">
+                <p16:designElem xmlns:p16="http://schemas.microsoft.com/office/powerpoint/2015/main" val="1"/>
+              </p:ext>
+            </p:extLst>
+          </p:nvPr>
+        </p:nvSpPr>
+        <p:spPr>
+          <a:xfrm>
+            <a:off x="0" y="0"/>
+            <a:ext cx="12192000" cy="6858000"/>
+          </a:xfrm>
+          <a:prstGeom prst="rect">
+            <a:avLst/>
+          </a:prstGeom>
+          <a:gradFill flip="none" rotWithShape="1">
+            <a:gsLst>
+              <a:gs pos="0">
+                <a:schemeClr val="accent1"/>
+              </a:gs>
+              <a:gs pos="100000">
+                <a:schemeClr val="accent2"/>
+              </a:gs>
+            </a:gsLst>
+            <a:lin ang="2700000" scaled="1"/>
+            <a:tileRect/>
+          </a:gradFill>
+          <a:ln>
+            <a:noFill/>
+          </a:ln>
+        </p:spPr>
+        <p:style>
+          <a:lnRef idx="2">
+            <a:schemeClr val="accent1">
+              <a:shade val="50000"/>
+            </a:schemeClr>
+          </a:lnRef>
+          <a:fillRef idx="1">
+            <a:schemeClr val="accent1"/>
+          </a:fillRef>
+          <a:effectRef idx="0">
+            <a:schemeClr val="accent1"/>
+          </a:effectRef>
+          <a:fontRef idx="minor">
+            <a:schemeClr val="lt1"/>
+          </a:fontRef>
+        </p:style>
+        <p:txBody>
+          <a:bodyPr rtlCol="0" anchor="ctr"/>
+          <a:lstStyle/>
+          <a:p>
+            <a:pPr algn="ctr"/>
+            <a:endParaRPr lang="en-US"/>
+          </a:p>
+        </p:txBody>
+      </p:sp>
+      <p:sp>
+        <p:nvSpPr>
+          <p:cNvPr id="2" name="TextBox 1">
+            <a:extLst>
+              <a:ext uri="{FF2B5EF4-FFF2-40B4-BE49-F238E27FC236}">
+                <a16:creationId xmlns:a16="http://schemas.microsoft.com/office/drawing/2014/main" id="{32726B2C-7675-7831-3F7E-A60BA0BBA464}"/>
+              </a:ext>
+            </a:extLst>
+          </p:cNvPr>
+          <p:cNvSpPr txBox="1"/>
+          <p:nvPr/>
+        </p:nvSpPr>
+        <p:spPr>
+          <a:xfrm>
+            <a:off x="1036320" y="7294"/>
+            <a:ext cx="9727474" cy="646331"/>
+          </a:xfrm>
+          <a:prstGeom prst="rect">
+            <a:avLst/>
+          </a:prstGeom>
+          <a:noFill/>
+        </p:spPr>
+        <p:txBody>
+          <a:bodyPr wrap="square" rtlCol="0">
+            <a:spAutoFit/>
+          </a:bodyPr>
+          <a:lstStyle/>
+          <a:p>
+            <a:pPr algn="ctr"/>
+            <a:r>
+              <a:rPr lang="en-US" sz="3600" b="1" dirty="0"/>
+              <a:t>Color Tab : Versions </a:t>
+            </a:r>
+          </a:p>
+        </p:txBody>
+      </p:sp>
+    </p:spTree>
+    <p:extLst>
+      <p:ext uri="{BB962C8B-B14F-4D97-AF65-F5344CB8AC3E}">
+        <p14:creationId xmlns:p14="http://schemas.microsoft.com/office/powerpoint/2010/main" val="1597642155"/>
       </p:ext>
     </p:extLst>
   </p:cSld>
@@ -7842,6 +8982,310 @@
     <p:extLst>
       <p:ext uri="{BB962C8B-B14F-4D97-AF65-F5344CB8AC3E}">
         <p14:creationId xmlns:p14="http://schemas.microsoft.com/office/powerpoint/2010/main" val="1472617438"/>
+      </p:ext>
+    </p:extLst>
+  </p:cSld>
+  <p:clrMapOvr>
+    <a:masterClrMapping/>
+  </p:clrMapOvr>
+</p:sld>
+</file>
+
+<file path=ppt/slides/slide20.xml><?xml version="1.0" encoding="utf-8"?>
+<p:sld xmlns:a="http://schemas.openxmlformats.org/drawingml/2006/main" xmlns:r="http://schemas.openxmlformats.org/officeDocument/2006/relationships" xmlns:p="http://schemas.openxmlformats.org/presentationml/2006/main">
+  <p:cSld>
+    <p:bg>
+      <p:bgPr>
+        <a:solidFill>
+          <a:schemeClr val="bg1"/>
+        </a:solidFill>
+        <a:effectLst/>
+      </p:bgPr>
+    </p:bg>
+    <p:spTree>
+      <p:nvGrpSpPr>
+        <p:cNvPr id="1" name="">
+          <a:extLst>
+            <a:ext uri="{FF2B5EF4-FFF2-40B4-BE49-F238E27FC236}">
+              <a16:creationId xmlns:a16="http://schemas.microsoft.com/office/drawing/2014/main" id="{15E1D518-185C-3E65-BFA8-9D4F192E3E0E}"/>
+            </a:ext>
+          </a:extLst>
+        </p:cNvPr>
+        <p:cNvGrpSpPr/>
+        <p:nvPr/>
+      </p:nvGrpSpPr>
+      <p:grpSpPr>
+        <a:xfrm>
+          <a:off x="0" y="0"/>
+          <a:ext cx="0" cy="0"/>
+          <a:chOff x="0" y="0"/>
+          <a:chExt cx="0" cy="0"/>
+        </a:xfrm>
+      </p:grpSpPr>
+      <p:sp>
+        <p:nvSpPr>
+          <p:cNvPr id="21" name="Rectangle 20">
+            <a:extLst>
+              <a:ext uri="{FF2B5EF4-FFF2-40B4-BE49-F238E27FC236}">
+                <a16:creationId xmlns:a16="http://schemas.microsoft.com/office/drawing/2014/main" id="{DC3F43D2-8799-F653-E12E-A401D54B3A84}"/>
+              </a:ext>
+              <a:ext uri="{C183D7F6-B498-43B3-948B-1728B52AA6E4}">
+                <adec:decorative xmlns:adec="http://schemas.microsoft.com/office/drawing/2017/decorative" val="1"/>
+              </a:ext>
+            </a:extLst>
+          </p:cNvPr>
+          <p:cNvSpPr>
+            <a:spLocks noGrp="1" noRot="1" noChangeAspect="1" noMove="1" noResize="1" noEditPoints="1" noAdjustHandles="1" noChangeArrowheads="1" noChangeShapeType="1" noTextEdit="1"/>
+          </p:cNvSpPr>
+          <p:nvPr>
+            <p:extLst>
+              <p:ext uri="{386F3935-93C4-4BCD-93E2-E3B085C9AB24}">
+                <p16:designElem xmlns:p16="http://schemas.microsoft.com/office/powerpoint/2015/main" val="1"/>
+              </p:ext>
+            </p:extLst>
+          </p:nvPr>
+        </p:nvSpPr>
+        <p:spPr>
+          <a:xfrm>
+            <a:off x="0" y="0"/>
+            <a:ext cx="12192000" cy="6858000"/>
+          </a:xfrm>
+          <a:prstGeom prst="rect">
+            <a:avLst/>
+          </a:prstGeom>
+          <a:gradFill flip="none" rotWithShape="1">
+            <a:gsLst>
+              <a:gs pos="0">
+                <a:schemeClr val="accent1"/>
+              </a:gs>
+              <a:gs pos="100000">
+                <a:schemeClr val="accent2"/>
+              </a:gs>
+            </a:gsLst>
+            <a:lin ang="2700000" scaled="1"/>
+            <a:tileRect/>
+          </a:gradFill>
+          <a:ln>
+            <a:noFill/>
+          </a:ln>
+        </p:spPr>
+        <p:style>
+          <a:lnRef idx="2">
+            <a:schemeClr val="accent1">
+              <a:shade val="50000"/>
+            </a:schemeClr>
+          </a:lnRef>
+          <a:fillRef idx="1">
+            <a:schemeClr val="accent1"/>
+          </a:fillRef>
+          <a:effectRef idx="0">
+            <a:schemeClr val="accent1"/>
+          </a:effectRef>
+          <a:fontRef idx="minor">
+            <a:schemeClr val="lt1"/>
+          </a:fontRef>
+        </p:style>
+        <p:txBody>
+          <a:bodyPr rtlCol="0" anchor="ctr"/>
+          <a:lstStyle/>
+          <a:p>
+            <a:pPr algn="ctr"/>
+            <a:endParaRPr lang="en-US"/>
+          </a:p>
+        </p:txBody>
+      </p:sp>
+      <p:sp>
+        <p:nvSpPr>
+          <p:cNvPr id="2" name="TextBox 1">
+            <a:extLst>
+              <a:ext uri="{FF2B5EF4-FFF2-40B4-BE49-F238E27FC236}">
+                <a16:creationId xmlns:a16="http://schemas.microsoft.com/office/drawing/2014/main" id="{D458D376-E919-C07F-EA2A-D8BAB31D4AD1}"/>
+              </a:ext>
+            </a:extLst>
+          </p:cNvPr>
+          <p:cNvSpPr txBox="1"/>
+          <p:nvPr/>
+        </p:nvSpPr>
+        <p:spPr>
+          <a:xfrm>
+            <a:off x="1036320" y="7294"/>
+            <a:ext cx="9727474" cy="646331"/>
+          </a:xfrm>
+          <a:prstGeom prst="rect">
+            <a:avLst/>
+          </a:prstGeom>
+          <a:noFill/>
+        </p:spPr>
+        <p:txBody>
+          <a:bodyPr wrap="square" rtlCol="0">
+            <a:spAutoFit/>
+          </a:bodyPr>
+          <a:lstStyle/>
+          <a:p>
+            <a:pPr algn="ctr"/>
+            <a:r>
+              <a:rPr lang="en-US" sz="3600" b="1" dirty="0"/>
+              <a:t>Color Tab : Versions </a:t>
+            </a:r>
+          </a:p>
+        </p:txBody>
+      </p:sp>
+    </p:spTree>
+    <p:extLst>
+      <p:ext uri="{BB962C8B-B14F-4D97-AF65-F5344CB8AC3E}">
+        <p14:creationId xmlns:p14="http://schemas.microsoft.com/office/powerpoint/2010/main" val="2004219619"/>
+      </p:ext>
+    </p:extLst>
+  </p:cSld>
+  <p:clrMapOvr>
+    <a:masterClrMapping/>
+  </p:clrMapOvr>
+</p:sld>
+</file>
+
+<file path=ppt/slides/slide21.xml><?xml version="1.0" encoding="utf-8"?>
+<p:sld xmlns:a="http://schemas.openxmlformats.org/drawingml/2006/main" xmlns:r="http://schemas.openxmlformats.org/officeDocument/2006/relationships" xmlns:p="http://schemas.openxmlformats.org/presentationml/2006/main">
+  <p:cSld>
+    <p:bg>
+      <p:bgPr>
+        <a:solidFill>
+          <a:schemeClr val="bg1"/>
+        </a:solidFill>
+        <a:effectLst/>
+      </p:bgPr>
+    </p:bg>
+    <p:spTree>
+      <p:nvGrpSpPr>
+        <p:cNvPr id="1" name="">
+          <a:extLst>
+            <a:ext uri="{FF2B5EF4-FFF2-40B4-BE49-F238E27FC236}">
+              <a16:creationId xmlns:a16="http://schemas.microsoft.com/office/drawing/2014/main" id="{0151E1D7-BCF6-758A-2482-176B2F153888}"/>
+            </a:ext>
+          </a:extLst>
+        </p:cNvPr>
+        <p:cNvGrpSpPr/>
+        <p:nvPr/>
+      </p:nvGrpSpPr>
+      <p:grpSpPr>
+        <a:xfrm>
+          <a:off x="0" y="0"/>
+          <a:ext cx="0" cy="0"/>
+          <a:chOff x="0" y="0"/>
+          <a:chExt cx="0" cy="0"/>
+        </a:xfrm>
+      </p:grpSpPr>
+      <p:sp>
+        <p:nvSpPr>
+          <p:cNvPr id="21" name="Rectangle 20">
+            <a:extLst>
+              <a:ext uri="{FF2B5EF4-FFF2-40B4-BE49-F238E27FC236}">
+                <a16:creationId xmlns:a16="http://schemas.microsoft.com/office/drawing/2014/main" id="{12BB11F6-066E-0FB6-5501-77499A4791D6}"/>
+              </a:ext>
+              <a:ext uri="{C183D7F6-B498-43B3-948B-1728B52AA6E4}">
+                <adec:decorative xmlns:adec="http://schemas.microsoft.com/office/drawing/2017/decorative" val="1"/>
+              </a:ext>
+            </a:extLst>
+          </p:cNvPr>
+          <p:cNvSpPr>
+            <a:spLocks noGrp="1" noRot="1" noChangeAspect="1" noMove="1" noResize="1" noEditPoints="1" noAdjustHandles="1" noChangeArrowheads="1" noChangeShapeType="1" noTextEdit="1"/>
+          </p:cNvSpPr>
+          <p:nvPr>
+            <p:extLst>
+              <p:ext uri="{386F3935-93C4-4BCD-93E2-E3B085C9AB24}">
+                <p16:designElem xmlns:p16="http://schemas.microsoft.com/office/powerpoint/2015/main" val="1"/>
+              </p:ext>
+            </p:extLst>
+          </p:nvPr>
+        </p:nvSpPr>
+        <p:spPr>
+          <a:xfrm>
+            <a:off x="0" y="0"/>
+            <a:ext cx="12192000" cy="6858000"/>
+          </a:xfrm>
+          <a:prstGeom prst="rect">
+            <a:avLst/>
+          </a:prstGeom>
+          <a:gradFill flip="none" rotWithShape="1">
+            <a:gsLst>
+              <a:gs pos="0">
+                <a:schemeClr val="accent1"/>
+              </a:gs>
+              <a:gs pos="100000">
+                <a:schemeClr val="accent2"/>
+              </a:gs>
+            </a:gsLst>
+            <a:lin ang="2700000" scaled="1"/>
+            <a:tileRect/>
+          </a:gradFill>
+          <a:ln>
+            <a:noFill/>
+          </a:ln>
+        </p:spPr>
+        <p:style>
+          <a:lnRef idx="2">
+            <a:schemeClr val="accent1">
+              <a:shade val="50000"/>
+            </a:schemeClr>
+          </a:lnRef>
+          <a:fillRef idx="1">
+            <a:schemeClr val="accent1"/>
+          </a:fillRef>
+          <a:effectRef idx="0">
+            <a:schemeClr val="accent1"/>
+          </a:effectRef>
+          <a:fontRef idx="minor">
+            <a:schemeClr val="lt1"/>
+          </a:fontRef>
+        </p:style>
+        <p:txBody>
+          <a:bodyPr rtlCol="0" anchor="ctr"/>
+          <a:lstStyle/>
+          <a:p>
+            <a:pPr algn="ctr"/>
+            <a:endParaRPr lang="en-US"/>
+          </a:p>
+        </p:txBody>
+      </p:sp>
+      <p:sp>
+        <p:nvSpPr>
+          <p:cNvPr id="2" name="TextBox 1">
+            <a:extLst>
+              <a:ext uri="{FF2B5EF4-FFF2-40B4-BE49-F238E27FC236}">
+                <a16:creationId xmlns:a16="http://schemas.microsoft.com/office/drawing/2014/main" id="{D5F20F14-87DC-8386-5249-C871A0AAC2F5}"/>
+              </a:ext>
+            </a:extLst>
+          </p:cNvPr>
+          <p:cNvSpPr txBox="1"/>
+          <p:nvPr/>
+        </p:nvSpPr>
+        <p:spPr>
+          <a:xfrm>
+            <a:off x="1036320" y="7294"/>
+            <a:ext cx="9727474" cy="646331"/>
+          </a:xfrm>
+          <a:prstGeom prst="rect">
+            <a:avLst/>
+          </a:prstGeom>
+          <a:noFill/>
+        </p:spPr>
+        <p:txBody>
+          <a:bodyPr wrap="square" rtlCol="0">
+            <a:spAutoFit/>
+          </a:bodyPr>
+          <a:lstStyle/>
+          <a:p>
+            <a:pPr algn="ctr"/>
+            <a:r>
+              <a:rPr lang="en-US" sz="3600" b="1" dirty="0"/>
+              <a:t>Color Tab : Versions </a:t>
+            </a:r>
+          </a:p>
+        </p:txBody>
+      </p:sp>
+    </p:spTree>
+    <p:extLst>
+      <p:ext uri="{BB962C8B-B14F-4D97-AF65-F5344CB8AC3E}">
+        <p14:creationId xmlns:p14="http://schemas.microsoft.com/office/powerpoint/2010/main" val="535233787"/>
       </p:ext>
     </p:extLst>
   </p:cSld>

</xml_diff>